<commit_message>
Add Presenter to PPT
</commit_message>
<xml_diff>
--- a/VierGewinnt.pptx
+++ b/VierGewinnt.pptx
@@ -128,6 +128,77 @@
 </p:presentation>
 </file>
 
+<file path=ppt/revisionInfo.xml><?xml version="1.0" encoding="utf-8"?>
+<p1510:revInfo xmlns:a="http://schemas.openxmlformats.org/drawingml/2006/main" xmlns:r="http://schemas.openxmlformats.org/officeDocument/2006/relationships" xmlns:p1510="http://schemas.microsoft.com/office/powerpoint/2015/10/main">
+  <p1510:revLst>
+    <p1510:client id="{820D4242-43EA-46E6-81B7-6465D4F89800}" v="50" dt="2018-12-11T09:56:03.773"/>
+  </p1510:revLst>
+</p1510:revInfo>
+</file>
+
+<file path=ppt/changesInfos/changesInfo1.xml><?xml version="1.0" encoding="utf-8"?>
+<pc:chgInfo xmlns:a="http://schemas.openxmlformats.org/drawingml/2006/main" xmlns:r="http://schemas.openxmlformats.org/officeDocument/2006/relationships" xmlns:ac="http://schemas.microsoft.com/office/drawing/2013/main/command" xmlns:pc="http://schemas.microsoft.com/office/powerpoint/2013/main/command">
+  <pc:docChgLst>
+    <pc:chgData name="Riesinger, Pascal" userId="b20ee373-397d-454b-8ed3-652fbfccf75c" providerId="ADAL" clId="{820D4242-43EA-46E6-81B7-6465D4F89800}"/>
+    <pc:docChg chg="modSld">
+      <pc:chgData name="Riesinger, Pascal" userId="b20ee373-397d-454b-8ed3-652fbfccf75c" providerId="ADAL" clId="{820D4242-43EA-46E6-81B7-6465D4F89800}" dt="2018-12-11T09:56:03.773" v="49" actId="20577"/>
+      <pc:docMkLst>
+        <pc:docMk/>
+      </pc:docMkLst>
+      <pc:sldChg chg="modNotesTx">
+        <pc:chgData name="Riesinger, Pascal" userId="b20ee373-397d-454b-8ed3-652fbfccf75c" providerId="ADAL" clId="{820D4242-43EA-46E6-81B7-6465D4F89800}" dt="2018-12-11T09:52:26.435" v="6" actId="20577"/>
+        <pc:sldMkLst>
+          <pc:docMk/>
+          <pc:sldMk cId="3600987528" sldId="256"/>
+        </pc:sldMkLst>
+      </pc:sldChg>
+      <pc:sldChg chg="modNotesTx">
+        <pc:chgData name="Riesinger, Pascal" userId="b20ee373-397d-454b-8ed3-652fbfccf75c" providerId="ADAL" clId="{820D4242-43EA-46E6-81B7-6465D4F89800}" dt="2018-12-11T09:56:03.773" v="49" actId="20577"/>
+        <pc:sldMkLst>
+          <pc:docMk/>
+          <pc:sldMk cId="3203935500" sldId="258"/>
+        </pc:sldMkLst>
+      </pc:sldChg>
+      <pc:sldChg chg="modNotesTx">
+        <pc:chgData name="Riesinger, Pascal" userId="b20ee373-397d-454b-8ed3-652fbfccf75c" providerId="ADAL" clId="{820D4242-43EA-46E6-81B7-6465D4F89800}" dt="2018-12-11T09:55:15.734" v="18" actId="20577"/>
+        <pc:sldMkLst>
+          <pc:docMk/>
+          <pc:sldMk cId="1024924244" sldId="259"/>
+        </pc:sldMkLst>
+      </pc:sldChg>
+      <pc:sldChg chg="modNotesTx">
+        <pc:chgData name="Riesinger, Pascal" userId="b20ee373-397d-454b-8ed3-652fbfccf75c" providerId="ADAL" clId="{820D4242-43EA-46E6-81B7-6465D4F89800}" dt="2018-12-11T09:55:20.910" v="21" actId="20577"/>
+        <pc:sldMkLst>
+          <pc:docMk/>
+          <pc:sldMk cId="2952799758" sldId="262"/>
+        </pc:sldMkLst>
+      </pc:sldChg>
+      <pc:sldChg chg="modNotesTx">
+        <pc:chgData name="Riesinger, Pascal" userId="b20ee373-397d-454b-8ed3-652fbfccf75c" providerId="ADAL" clId="{820D4242-43EA-46E6-81B7-6465D4F89800}" dt="2018-12-11T09:55:56" v="40" actId="20577"/>
+        <pc:sldMkLst>
+          <pc:docMk/>
+          <pc:sldMk cId="566164889" sldId="263"/>
+        </pc:sldMkLst>
+      </pc:sldChg>
+      <pc:sldChg chg="modNotesTx">
+        <pc:chgData name="Riesinger, Pascal" userId="b20ee373-397d-454b-8ed3-652fbfccf75c" providerId="ADAL" clId="{820D4242-43EA-46E6-81B7-6465D4F89800}" dt="2018-12-11T09:54:46.603" v="12" actId="20577"/>
+        <pc:sldMkLst>
+          <pc:docMk/>
+          <pc:sldMk cId="1330431816" sldId="270"/>
+        </pc:sldMkLst>
+      </pc:sldChg>
+      <pc:sldChg chg="modNotesTx">
+        <pc:chgData name="Riesinger, Pascal" userId="b20ee373-397d-454b-8ed3-652fbfccf75c" providerId="ADAL" clId="{820D4242-43EA-46E6-81B7-6465D4F89800}" dt="2018-12-11T09:55:51.374" v="32" actId="20577"/>
+        <pc:sldMkLst>
+          <pc:docMk/>
+          <pc:sldMk cId="1121345616" sldId="271"/>
+        </pc:sldMkLst>
+      </pc:sldChg>
+    </pc:docChg>
+  </pc:docChgLst>
+</pc:chgInfo>
+</file>
+
 <file path=ppt/notesMasters/notesMaster1.xml><?xml version="1.0" encoding="utf-8"?>
 <p:notesMaster xmlns:a="http://schemas.openxmlformats.org/drawingml/2006/main" xmlns:r="http://schemas.openxmlformats.org/officeDocument/2006/relationships" xmlns:p="http://schemas.openxmlformats.org/presentationml/2006/main">
   <p:cSld>
@@ -496,6 +567,357 @@
       </p:grpSpPr>
       <p:sp>
         <p:nvSpPr>
+          <p:cNvPr id="2" name="Slide Image Placeholder 1"/>
+          <p:cNvSpPr>
+            <a:spLocks noGrp="1" noRot="1" noChangeAspect="1"/>
+          </p:cNvSpPr>
+          <p:nvPr>
+            <p:ph type="sldImg"/>
+          </p:nvPr>
+        </p:nvSpPr>
+        <p:spPr/>
+      </p:sp>
+      <p:sp>
+        <p:nvSpPr>
+          <p:cNvPr id="3" name="Notes Placeholder 2"/>
+          <p:cNvSpPr>
+            <a:spLocks noGrp="1"/>
+          </p:cNvSpPr>
+          <p:nvPr>
+            <p:ph type="body" idx="1"/>
+          </p:nvPr>
+        </p:nvSpPr>
+        <p:spPr/>
+        <p:txBody>
+          <a:bodyPr/>
+          <a:lstStyle/>
+          <a:p>
+            <a:r>
+              <a:rPr lang="en-US" dirty="0"/>
+              <a:t>Martin</a:t>
+            </a:r>
+          </a:p>
+          <a:p>
+            <a:endParaRPr lang="en-US" dirty="0"/>
+          </a:p>
+        </p:txBody>
+      </p:sp>
+      <p:sp>
+        <p:nvSpPr>
+          <p:cNvPr id="4" name="Slide Number Placeholder 3"/>
+          <p:cNvSpPr>
+            <a:spLocks noGrp="1"/>
+          </p:cNvSpPr>
+          <p:nvPr>
+            <p:ph type="sldNum" sz="quarter" idx="5"/>
+          </p:nvPr>
+        </p:nvSpPr>
+        <p:spPr/>
+        <p:txBody>
+          <a:bodyPr/>
+          <a:lstStyle/>
+          <a:p>
+            <a:fld id="{0CDA9607-FCE4-497D-AD75-D71330362BE7}" type="slidenum">
+              <a:rPr lang="de-DE" smtClean="0"/>
+              <a:t>1</a:t>
+            </a:fld>
+            <a:endParaRPr lang="de-DE"/>
+          </a:p>
+        </p:txBody>
+      </p:sp>
+    </p:spTree>
+    <p:extLst>
+      <p:ext uri="{BB962C8B-B14F-4D97-AF65-F5344CB8AC3E}">
+        <p14:creationId xmlns:p14="http://schemas.microsoft.com/office/powerpoint/2010/main" val="1687019647"/>
+      </p:ext>
+    </p:extLst>
+  </p:cSld>
+  <p:clrMapOvr>
+    <a:masterClrMapping/>
+  </p:clrMapOvr>
+</p:notes>
+</file>
+
+<file path=ppt/notesSlides/notesSlide2.xml><?xml version="1.0" encoding="utf-8"?>
+<p:notes xmlns:a="http://schemas.openxmlformats.org/drawingml/2006/main" xmlns:r="http://schemas.openxmlformats.org/officeDocument/2006/relationships" xmlns:p="http://schemas.openxmlformats.org/presentationml/2006/main">
+  <p:cSld>
+    <p:spTree>
+      <p:nvGrpSpPr>
+        <p:cNvPr id="1" name=""/>
+        <p:cNvGrpSpPr/>
+        <p:nvPr/>
+      </p:nvGrpSpPr>
+      <p:grpSpPr>
+        <a:xfrm>
+          <a:off x="0" y="0"/>
+          <a:ext cx="0" cy="0"/>
+          <a:chOff x="0" y="0"/>
+          <a:chExt cx="0" cy="0"/>
+        </a:xfrm>
+      </p:grpSpPr>
+      <p:sp>
+        <p:nvSpPr>
+          <p:cNvPr id="2" name="Slide Image Placeholder 1"/>
+          <p:cNvSpPr>
+            <a:spLocks noGrp="1" noRot="1" noChangeAspect="1"/>
+          </p:cNvSpPr>
+          <p:nvPr>
+            <p:ph type="sldImg"/>
+          </p:nvPr>
+        </p:nvSpPr>
+        <p:spPr/>
+      </p:sp>
+      <p:sp>
+        <p:nvSpPr>
+          <p:cNvPr id="3" name="Notes Placeholder 2"/>
+          <p:cNvSpPr>
+            <a:spLocks noGrp="1"/>
+          </p:cNvSpPr>
+          <p:nvPr>
+            <p:ph type="body" idx="1"/>
+          </p:nvPr>
+        </p:nvSpPr>
+        <p:spPr/>
+        <p:txBody>
+          <a:bodyPr/>
+          <a:lstStyle/>
+          <a:p>
+            <a:r>
+              <a:rPr lang="en-US" dirty="0"/>
+              <a:t>-&gt; Sophia</a:t>
+            </a:r>
+          </a:p>
+        </p:txBody>
+      </p:sp>
+      <p:sp>
+        <p:nvSpPr>
+          <p:cNvPr id="4" name="Slide Number Placeholder 3"/>
+          <p:cNvSpPr>
+            <a:spLocks noGrp="1"/>
+          </p:cNvSpPr>
+          <p:nvPr>
+            <p:ph type="sldNum" sz="quarter" idx="5"/>
+          </p:nvPr>
+        </p:nvSpPr>
+        <p:spPr/>
+        <p:txBody>
+          <a:bodyPr/>
+          <a:lstStyle/>
+          <a:p>
+            <a:fld id="{0CDA9607-FCE4-497D-AD75-D71330362BE7}" type="slidenum">
+              <a:rPr lang="de-DE" smtClean="0"/>
+              <a:t>3</a:t>
+            </a:fld>
+            <a:endParaRPr lang="de-DE"/>
+          </a:p>
+        </p:txBody>
+      </p:sp>
+    </p:spTree>
+    <p:extLst>
+      <p:ext uri="{BB962C8B-B14F-4D97-AF65-F5344CB8AC3E}">
+        <p14:creationId xmlns:p14="http://schemas.microsoft.com/office/powerpoint/2010/main" val="1998145753"/>
+      </p:ext>
+    </p:extLst>
+  </p:cSld>
+  <p:clrMapOvr>
+    <a:masterClrMapping/>
+  </p:clrMapOvr>
+</p:notes>
+</file>
+
+<file path=ppt/notesSlides/notesSlide3.xml><?xml version="1.0" encoding="utf-8"?>
+<p:notes xmlns:a="http://schemas.openxmlformats.org/drawingml/2006/main" xmlns:r="http://schemas.openxmlformats.org/officeDocument/2006/relationships" xmlns:p="http://schemas.openxmlformats.org/presentationml/2006/main">
+  <p:cSld>
+    <p:spTree>
+      <p:nvGrpSpPr>
+        <p:cNvPr id="1" name=""/>
+        <p:cNvGrpSpPr/>
+        <p:nvPr/>
+      </p:nvGrpSpPr>
+      <p:grpSpPr>
+        <a:xfrm>
+          <a:off x="0" y="0"/>
+          <a:ext cx="0" cy="0"/>
+          <a:chOff x="0" y="0"/>
+          <a:chExt cx="0" cy="0"/>
+        </a:xfrm>
+      </p:grpSpPr>
+      <p:sp>
+        <p:nvSpPr>
+          <p:cNvPr id="2" name="Slide Image Placeholder 1"/>
+          <p:cNvSpPr>
+            <a:spLocks noGrp="1" noRot="1" noChangeAspect="1"/>
+          </p:cNvSpPr>
+          <p:nvPr>
+            <p:ph type="sldImg"/>
+          </p:nvPr>
+        </p:nvSpPr>
+        <p:spPr/>
+      </p:sp>
+      <p:sp>
+        <p:nvSpPr>
+          <p:cNvPr id="3" name="Notes Placeholder 2"/>
+          <p:cNvSpPr>
+            <a:spLocks noGrp="1"/>
+          </p:cNvSpPr>
+          <p:nvPr>
+            <p:ph type="body" idx="1"/>
+          </p:nvPr>
+        </p:nvSpPr>
+        <p:spPr/>
+        <p:txBody>
+          <a:bodyPr/>
+          <a:lstStyle/>
+          <a:p>
+            <a:r>
+              <a:rPr lang="en-US" dirty="0"/>
+              <a:t>Sophia</a:t>
+            </a:r>
+          </a:p>
+        </p:txBody>
+      </p:sp>
+      <p:sp>
+        <p:nvSpPr>
+          <p:cNvPr id="4" name="Slide Number Placeholder 3"/>
+          <p:cNvSpPr>
+            <a:spLocks noGrp="1"/>
+          </p:cNvSpPr>
+          <p:nvPr>
+            <p:ph type="sldNum" sz="quarter" idx="5"/>
+          </p:nvPr>
+        </p:nvSpPr>
+        <p:spPr/>
+        <p:txBody>
+          <a:bodyPr/>
+          <a:lstStyle/>
+          <a:p>
+            <a:fld id="{0CDA9607-FCE4-497D-AD75-D71330362BE7}" type="slidenum">
+              <a:rPr lang="de-DE" smtClean="0"/>
+              <a:t>4</a:t>
+            </a:fld>
+            <a:endParaRPr lang="de-DE"/>
+          </a:p>
+        </p:txBody>
+      </p:sp>
+    </p:spTree>
+    <p:extLst>
+      <p:ext uri="{BB962C8B-B14F-4D97-AF65-F5344CB8AC3E}">
+        <p14:creationId xmlns:p14="http://schemas.microsoft.com/office/powerpoint/2010/main" val="2258335551"/>
+      </p:ext>
+    </p:extLst>
+  </p:cSld>
+  <p:clrMapOvr>
+    <a:masterClrMapping/>
+  </p:clrMapOvr>
+</p:notes>
+</file>
+
+<file path=ppt/notesSlides/notesSlide4.xml><?xml version="1.0" encoding="utf-8"?>
+<p:notes xmlns:a="http://schemas.openxmlformats.org/drawingml/2006/main" xmlns:r="http://schemas.openxmlformats.org/officeDocument/2006/relationships" xmlns:p="http://schemas.openxmlformats.org/presentationml/2006/main">
+  <p:cSld>
+    <p:spTree>
+      <p:nvGrpSpPr>
+        <p:cNvPr id="1" name=""/>
+        <p:cNvGrpSpPr/>
+        <p:nvPr/>
+      </p:nvGrpSpPr>
+      <p:grpSpPr>
+        <a:xfrm>
+          <a:off x="0" y="0"/>
+          <a:ext cx="0" cy="0"/>
+          <a:chOff x="0" y="0"/>
+          <a:chExt cx="0" cy="0"/>
+        </a:xfrm>
+      </p:grpSpPr>
+      <p:sp>
+        <p:nvSpPr>
+          <p:cNvPr id="2" name="Slide Image Placeholder 1"/>
+          <p:cNvSpPr>
+            <a:spLocks noGrp="1" noRot="1" noChangeAspect="1"/>
+          </p:cNvSpPr>
+          <p:nvPr>
+            <p:ph type="sldImg"/>
+          </p:nvPr>
+        </p:nvSpPr>
+        <p:spPr/>
+      </p:sp>
+      <p:sp>
+        <p:nvSpPr>
+          <p:cNvPr id="3" name="Notes Placeholder 2"/>
+          <p:cNvSpPr>
+            <a:spLocks noGrp="1"/>
+          </p:cNvSpPr>
+          <p:nvPr>
+            <p:ph type="body" idx="1"/>
+          </p:nvPr>
+        </p:nvSpPr>
+        <p:spPr/>
+        <p:txBody>
+          <a:bodyPr/>
+          <a:lstStyle/>
+          <a:p>
+            <a:r>
+              <a:rPr lang="en-US" dirty="0"/>
+              <a:t>-&gt; Pascal</a:t>
+            </a:r>
+          </a:p>
+        </p:txBody>
+      </p:sp>
+      <p:sp>
+        <p:nvSpPr>
+          <p:cNvPr id="4" name="Slide Number Placeholder 3"/>
+          <p:cNvSpPr>
+            <a:spLocks noGrp="1"/>
+          </p:cNvSpPr>
+          <p:nvPr>
+            <p:ph type="sldNum" sz="quarter" idx="5"/>
+          </p:nvPr>
+        </p:nvSpPr>
+        <p:spPr/>
+        <p:txBody>
+          <a:bodyPr/>
+          <a:lstStyle/>
+          <a:p>
+            <a:fld id="{0CDA9607-FCE4-497D-AD75-D71330362BE7}" type="slidenum">
+              <a:rPr lang="de-DE" smtClean="0"/>
+              <a:t>5</a:t>
+            </a:fld>
+            <a:endParaRPr lang="de-DE"/>
+          </a:p>
+        </p:txBody>
+      </p:sp>
+    </p:spTree>
+    <p:extLst>
+      <p:ext uri="{BB962C8B-B14F-4D97-AF65-F5344CB8AC3E}">
+        <p14:creationId xmlns:p14="http://schemas.microsoft.com/office/powerpoint/2010/main" val="2587706841"/>
+      </p:ext>
+    </p:extLst>
+  </p:cSld>
+  <p:clrMapOvr>
+    <a:masterClrMapping/>
+  </p:clrMapOvr>
+</p:notes>
+</file>
+
+<file path=ppt/notesSlides/notesSlide5.xml><?xml version="1.0" encoding="utf-8"?>
+<p:notes xmlns:a="http://schemas.openxmlformats.org/drawingml/2006/main" xmlns:r="http://schemas.openxmlformats.org/officeDocument/2006/relationships" xmlns:p="http://schemas.openxmlformats.org/presentationml/2006/main">
+  <p:cSld>
+    <p:spTree>
+      <p:nvGrpSpPr>
+        <p:cNvPr id="1" name=""/>
+        <p:cNvGrpSpPr/>
+        <p:nvPr/>
+      </p:nvGrpSpPr>
+      <p:grpSpPr>
+        <a:xfrm>
+          <a:off x="0" y="0"/>
+          <a:ext cx="0" cy="0"/>
+          <a:chOff x="0" y="0"/>
+          <a:chExt cx="0" cy="0"/>
+        </a:xfrm>
+      </p:grpSpPr>
+      <p:sp>
+        <p:nvSpPr>
           <p:cNvPr id="2" name="Folienbildplatzhalter 1"/>
           <p:cNvSpPr>
             <a:spLocks noGrp="1" noRot="1" noChangeAspect="1"/>
@@ -521,7 +943,10 @@
           <a:bodyPr/>
           <a:lstStyle/>
           <a:p>
-            <a:endParaRPr lang="de-DE" dirty="0"/>
+            <a:r>
+              <a:rPr lang="de-DE" dirty="0"/>
+              <a:t>Pascal</a:t>
+            </a:r>
           </a:p>
         </p:txBody>
       </p:sp>
@@ -552,6 +977,180 @@
     <p:extLst>
       <p:ext uri="{BB962C8B-B14F-4D97-AF65-F5344CB8AC3E}">
         <p14:creationId xmlns:p14="http://schemas.microsoft.com/office/powerpoint/2010/main" val="3142411823"/>
+      </p:ext>
+    </p:extLst>
+  </p:cSld>
+  <p:clrMapOvr>
+    <a:masterClrMapping/>
+  </p:clrMapOvr>
+</p:notes>
+</file>
+
+<file path=ppt/notesSlides/notesSlide6.xml><?xml version="1.0" encoding="utf-8"?>
+<p:notes xmlns:a="http://schemas.openxmlformats.org/drawingml/2006/main" xmlns:r="http://schemas.openxmlformats.org/officeDocument/2006/relationships" xmlns:p="http://schemas.openxmlformats.org/presentationml/2006/main">
+  <p:cSld>
+    <p:spTree>
+      <p:nvGrpSpPr>
+        <p:cNvPr id="1" name=""/>
+        <p:cNvGrpSpPr/>
+        <p:nvPr/>
+      </p:nvGrpSpPr>
+      <p:grpSpPr>
+        <a:xfrm>
+          <a:off x="0" y="0"/>
+          <a:ext cx="0" cy="0"/>
+          <a:chOff x="0" y="0"/>
+          <a:chExt cx="0" cy="0"/>
+        </a:xfrm>
+      </p:grpSpPr>
+      <p:sp>
+        <p:nvSpPr>
+          <p:cNvPr id="2" name="Slide Image Placeholder 1"/>
+          <p:cNvSpPr>
+            <a:spLocks noGrp="1" noRot="1" noChangeAspect="1"/>
+          </p:cNvSpPr>
+          <p:nvPr>
+            <p:ph type="sldImg"/>
+          </p:nvPr>
+        </p:nvSpPr>
+        <p:spPr/>
+      </p:sp>
+      <p:sp>
+        <p:nvSpPr>
+          <p:cNvPr id="3" name="Notes Placeholder 2"/>
+          <p:cNvSpPr>
+            <a:spLocks noGrp="1"/>
+          </p:cNvSpPr>
+          <p:nvPr>
+            <p:ph type="body" idx="1"/>
+          </p:nvPr>
+        </p:nvSpPr>
+        <p:spPr/>
+        <p:txBody>
+          <a:bodyPr/>
+          <a:lstStyle/>
+          <a:p>
+            <a:r>
+              <a:rPr lang="en-US" dirty="0"/>
+              <a:t>-&gt; Max</a:t>
+            </a:r>
+          </a:p>
+        </p:txBody>
+      </p:sp>
+      <p:sp>
+        <p:nvSpPr>
+          <p:cNvPr id="4" name="Slide Number Placeholder 3"/>
+          <p:cNvSpPr>
+            <a:spLocks noGrp="1"/>
+          </p:cNvSpPr>
+          <p:nvPr>
+            <p:ph type="sldNum" sz="quarter" idx="5"/>
+          </p:nvPr>
+        </p:nvSpPr>
+        <p:spPr/>
+        <p:txBody>
+          <a:bodyPr/>
+          <a:lstStyle/>
+          <a:p>
+            <a:fld id="{0CDA9607-FCE4-497D-AD75-D71330362BE7}" type="slidenum">
+              <a:rPr lang="de-DE" smtClean="0"/>
+              <a:t>8</a:t>
+            </a:fld>
+            <a:endParaRPr lang="de-DE"/>
+          </a:p>
+        </p:txBody>
+      </p:sp>
+    </p:spTree>
+    <p:extLst>
+      <p:ext uri="{BB962C8B-B14F-4D97-AF65-F5344CB8AC3E}">
+        <p14:creationId xmlns:p14="http://schemas.microsoft.com/office/powerpoint/2010/main" val="1506721980"/>
+      </p:ext>
+    </p:extLst>
+  </p:cSld>
+  <p:clrMapOvr>
+    <a:masterClrMapping/>
+  </p:clrMapOvr>
+</p:notes>
+</file>
+
+<file path=ppt/notesSlides/notesSlide7.xml><?xml version="1.0" encoding="utf-8"?>
+<p:notes xmlns:a="http://schemas.openxmlformats.org/drawingml/2006/main" xmlns:r="http://schemas.openxmlformats.org/officeDocument/2006/relationships" xmlns:p="http://schemas.openxmlformats.org/presentationml/2006/main">
+  <p:cSld>
+    <p:spTree>
+      <p:nvGrpSpPr>
+        <p:cNvPr id="1" name=""/>
+        <p:cNvGrpSpPr/>
+        <p:nvPr/>
+      </p:nvGrpSpPr>
+      <p:grpSpPr>
+        <a:xfrm>
+          <a:off x="0" y="0"/>
+          <a:ext cx="0" cy="0"/>
+          <a:chOff x="0" y="0"/>
+          <a:chExt cx="0" cy="0"/>
+        </a:xfrm>
+      </p:grpSpPr>
+      <p:sp>
+        <p:nvSpPr>
+          <p:cNvPr id="2" name="Slide Image Placeholder 1"/>
+          <p:cNvSpPr>
+            <a:spLocks noGrp="1" noRot="1" noChangeAspect="1"/>
+          </p:cNvSpPr>
+          <p:nvPr>
+            <p:ph type="sldImg"/>
+          </p:nvPr>
+        </p:nvSpPr>
+        <p:spPr/>
+      </p:sp>
+      <p:sp>
+        <p:nvSpPr>
+          <p:cNvPr id="3" name="Notes Placeholder 2"/>
+          <p:cNvSpPr>
+            <a:spLocks noGrp="1"/>
+          </p:cNvSpPr>
+          <p:nvPr>
+            <p:ph type="body" idx="1"/>
+          </p:nvPr>
+        </p:nvSpPr>
+        <p:spPr/>
+        <p:txBody>
+          <a:bodyPr/>
+          <a:lstStyle/>
+          <a:p>
+            <a:r>
+              <a:rPr lang="en-US" dirty="0"/>
+              <a:t>Max</a:t>
+            </a:r>
+          </a:p>
+        </p:txBody>
+      </p:sp>
+      <p:sp>
+        <p:nvSpPr>
+          <p:cNvPr id="4" name="Slide Number Placeholder 3"/>
+          <p:cNvSpPr>
+            <a:spLocks noGrp="1"/>
+          </p:cNvSpPr>
+          <p:nvPr>
+            <p:ph type="sldNum" sz="quarter" idx="5"/>
+          </p:nvPr>
+        </p:nvSpPr>
+        <p:spPr/>
+        <p:txBody>
+          <a:bodyPr/>
+          <a:lstStyle/>
+          <a:p>
+            <a:fld id="{0CDA9607-FCE4-497D-AD75-D71330362BE7}" type="slidenum">
+              <a:rPr lang="de-DE" smtClean="0"/>
+              <a:t>9</a:t>
+            </a:fld>
+            <a:endParaRPr lang="de-DE"/>
+          </a:p>
+        </p:txBody>
+      </p:sp>
+    </p:spTree>
+    <p:extLst>
+      <p:ext uri="{BB962C8B-B14F-4D97-AF65-F5344CB8AC3E}">
+        <p14:creationId xmlns:p14="http://schemas.microsoft.com/office/powerpoint/2010/main" val="1779622574"/>
       </p:ext>
     </p:extLst>
   </p:cSld>
@@ -3913,7 +4512,7 @@
           <p:nvPr/>
         </p:nvPicPr>
         <p:blipFill>
-          <a:blip r:embed="rId2">
+          <a:blip r:embed="rId3">
             <a:extLst>
               <a:ext uri="{28A0092B-C50C-407E-A947-70E740481C1C}">
                 <a14:useLocalDpi xmlns:a14="http://schemas.microsoft.com/office/drawing/2010/main" val="0"/>
@@ -7355,7 +7954,7 @@
           <p:nvPr/>
         </p:nvPicPr>
         <p:blipFill>
-          <a:blip r:embed="rId2"/>
+          <a:blip r:embed="rId3"/>
           <a:stretch>
             <a:fillRect/>
           </a:stretch>
@@ -7483,7 +8082,7 @@
           <p:nvPr/>
         </p:nvPicPr>
         <p:blipFill>
-          <a:blip r:embed="rId3"/>
+          <a:blip r:embed="rId4"/>
           <a:stretch>
             <a:fillRect/>
           </a:stretch>
@@ -8362,8 +8961,8 @@
           </a:p>
         </p:txBody>
       </p:sp>
-      <mc:AlternateContent xmlns:mc="http://schemas.openxmlformats.org/markup-compatibility/2006">
-        <mc:Choice xmlns:pslz="http://schemas.microsoft.com/office/powerpoint/2016/slidezoom" Requires="pslz">
+      <mc:AlternateContent xmlns:mc="http://schemas.openxmlformats.org/markup-compatibility/2006" xmlns:pslz="http://schemas.microsoft.com/office/powerpoint/2016/slidezoom">
+        <mc:Choice Requires="pslz">
           <p:graphicFrame>
             <p:nvGraphicFramePr>
               <p:cNvPr id="37" name="Folienzoom 36">
@@ -8424,7 +9023,7 @@
             </a:graphic>
           </p:graphicFrame>
         </mc:Choice>
-        <mc:Fallback>
+        <mc:Fallback xmlns="">
           <p:pic>
             <p:nvPicPr>
               <p:cNvPr id="37" name="Folienzoom 36">
@@ -8441,7 +9040,7 @@
               <p:nvPr/>
             </p:nvPicPr>
             <p:blipFill>
-              <a:blip r:embed="rId3">
+              <a:blip r:embed="rId5">
                 <a:extLst>
                   <a:ext uri="{28A0092B-C50C-407E-A947-70E740481C1C}">
                     <a14:useLocalDpi xmlns:a14="http://schemas.microsoft.com/office/drawing/2010/main" val="0"/>
@@ -8467,8 +9066,8 @@
           </p:pic>
         </mc:Fallback>
       </mc:AlternateContent>
-      <mc:AlternateContent xmlns:mc="http://schemas.openxmlformats.org/markup-compatibility/2006">
-        <mc:Choice xmlns:pslz="http://schemas.microsoft.com/office/powerpoint/2016/slidezoom" Requires="pslz">
+      <mc:AlternateContent xmlns:mc="http://schemas.openxmlformats.org/markup-compatibility/2006" xmlns:pslz="http://schemas.microsoft.com/office/powerpoint/2016/slidezoom">
+        <mc:Choice Requires="pslz">
           <p:graphicFrame>
             <p:nvGraphicFramePr>
               <p:cNvPr id="10" name="Folienzoom 9">
@@ -8499,7 +9098,7 @@
                   <pslz:sldZmObj sldId="263" cId="566164889">
                     <pslz:zmPr id="{2F6B6AE8-4D8C-4D39-8CA7-B4E3BC07D4BF}" imageType="cover" transitionDur="1000">
                       <p166:blipFill xmlns:p166="http://schemas.microsoft.com/office/powerpoint/2016/6/main">
-                        <a:blip r:embed="rId5">
+                        <a:blip r:embed="rId6">
                           <a:extLst>
                             <a:ext uri="{28A0092B-C50C-407E-A947-70E740481C1C}">
                               <a14:useLocalDpi xmlns:a14="http://schemas.microsoft.com/office/drawing/2010/main" val="0"/>
@@ -8531,11 +9130,11 @@
             </a:graphic>
           </p:graphicFrame>
         </mc:Choice>
-        <mc:Fallback>
+        <mc:Fallback xmlns="">
           <p:pic>
             <p:nvPicPr>
               <p:cNvPr id="10" name="Folienzoom 9">
-                <a:hlinkClick r:id="rId6" action="ppaction://hlinksldjump"/>
+                <a:hlinkClick r:id="rId7" action="ppaction://hlinksldjump"/>
                 <a:extLst>
                   <a:ext uri="{FF2B5EF4-FFF2-40B4-BE49-F238E27FC236}">
                     <a16:creationId xmlns:a16="http://schemas.microsoft.com/office/drawing/2014/main" id="{E85796D8-F401-4630-AE7F-DFBA8FE8BD15}"/>
@@ -8548,7 +9147,7 @@
               <p:nvPr/>
             </p:nvPicPr>
             <p:blipFill>
-              <a:blip r:embed="rId5">
+              <a:blip r:embed="rId8">
                 <a:extLst>
                   <a:ext uri="{28A0092B-C50C-407E-A947-70E740481C1C}">
                     <a14:useLocalDpi xmlns:a14="http://schemas.microsoft.com/office/drawing/2010/main" val="0"/>
@@ -10377,7 +10976,7 @@
                   <pslz:sldZmObj sldId="265" cId="754373753">
                     <pslz:zmPr id="{68D6DA47-4D26-4922-BA76-918F096EFEA8}" imageType="cover" transitionDur="1000">
                       <p166:blipFill xmlns:p166="http://schemas.microsoft.com/office/powerpoint/2016/6/main">
-                        <a:blip r:embed="rId2">
+                        <a:blip r:embed="rId3">
                           <a:extLst>
                             <a:ext uri="{28A0092B-C50C-407E-A947-70E740481C1C}">
                               <a14:useLocalDpi xmlns:a14="http://schemas.microsoft.com/office/drawing/2010/main" val="0"/>
@@ -10413,7 +11012,7 @@
           <p:pic>
             <p:nvPicPr>
               <p:cNvPr id="28" name="Folienzoom 27">
-                <a:hlinkClick r:id="rId3" action="ppaction://hlinksldjump"/>
+                <a:hlinkClick r:id="rId4" action="ppaction://hlinksldjump"/>
                 <a:extLst>
                   <a:ext uri="{FF2B5EF4-FFF2-40B4-BE49-F238E27FC236}">
                     <a16:creationId xmlns:a16="http://schemas.microsoft.com/office/drawing/2014/main" id="{76572E65-320D-4EE9-93C4-86F5654EA415}"/>

</xml_diff>

<commit_message>
Sophia Kommentare in PP
</commit_message>
<xml_diff>
--- a/VierGewinnt.pptx
+++ b/VierGewinnt.pptx
@@ -439,7 +439,7 @@
           <a:p>
             <a:fld id="{0CDA9607-FCE4-497D-AD75-D71330362BE7}" type="slidenum">
               <a:rPr lang="de-DE" smtClean="0"/>
-              <a:t>‹#›</a:t>
+              <a:t>‹Nr.›</a:t>
             </a:fld>
             <a:endParaRPr lang="de-DE"/>
           </a:p>
@@ -770,9 +770,247 @@
           <a:lstStyle/>
           <a:p>
             <a:r>
+              <a:rPr lang="en-US" dirty="0" err="1"/>
+              <a:t>Ausgabe</a:t>
+            </a:r>
+            <a:r>
               <a:rPr lang="en-US" dirty="0"/>
-              <a:t>Sophia</a:t>
-            </a:r>
+              <a:t>: LED –Matrix; </a:t>
+            </a:r>
+            <a:r>
+              <a:rPr lang="en-US" dirty="0" err="1"/>
+              <a:t>Horizontale</a:t>
+            </a:r>
+            <a:r>
+              <a:rPr lang="en-US" dirty="0"/>
+              <a:t> </a:t>
+            </a:r>
+            <a:r>
+              <a:rPr lang="en-US" dirty="0" err="1"/>
+              <a:t>über</a:t>
+            </a:r>
+            <a:r>
+              <a:rPr lang="en-US" dirty="0"/>
+              <a:t> Port 0, </a:t>
+            </a:r>
+            <a:r>
+              <a:rPr lang="en-US" dirty="0" err="1"/>
+              <a:t>Vertikale</a:t>
+            </a:r>
+            <a:r>
+              <a:rPr lang="en-US" dirty="0"/>
+              <a:t> </a:t>
+            </a:r>
+            <a:r>
+              <a:rPr lang="en-US" dirty="0" err="1"/>
+              <a:t>über</a:t>
+            </a:r>
+            <a:r>
+              <a:rPr lang="en-US" dirty="0"/>
+              <a:t> Port1</a:t>
+            </a:r>
+          </a:p>
+          <a:p>
+            <a:r>
+              <a:rPr lang="en-US" dirty="0"/>
+              <a:t>	</a:t>
+            </a:r>
+            <a:r>
+              <a:rPr lang="en-US" dirty="0" err="1"/>
+              <a:t>Spielsteine</a:t>
+            </a:r>
+            <a:r>
+              <a:rPr lang="en-US" dirty="0"/>
+              <a:t> </a:t>
+            </a:r>
+            <a:r>
+              <a:rPr lang="en-US" dirty="0" err="1"/>
+              <a:t>durch</a:t>
+            </a:r>
+            <a:r>
+              <a:rPr lang="en-US" dirty="0"/>
+              <a:t> </a:t>
+            </a:r>
+            <a:r>
+              <a:rPr lang="en-US" dirty="0" err="1"/>
+              <a:t>einleinzelne</a:t>
+            </a:r>
+            <a:r>
+              <a:rPr lang="en-US" dirty="0"/>
+              <a:t> LEDs, </a:t>
+            </a:r>
+            <a:r>
+              <a:rPr lang="en-US" dirty="0" err="1"/>
+              <a:t>Spieler</a:t>
+            </a:r>
+            <a:r>
+              <a:rPr lang="en-US" dirty="0"/>
+              <a:t> </a:t>
+            </a:r>
+            <a:r>
+              <a:rPr lang="en-US" dirty="0" err="1"/>
+              <a:t>unterscheidung</a:t>
+            </a:r>
+            <a:r>
+              <a:rPr lang="en-US" dirty="0"/>
+              <a:t> : 2. </a:t>
+            </a:r>
+            <a:r>
+              <a:rPr lang="en-US" dirty="0" err="1"/>
+              <a:t>Spieler</a:t>
+            </a:r>
+            <a:r>
+              <a:rPr lang="en-US" dirty="0"/>
+              <a:t> </a:t>
+            </a:r>
+            <a:r>
+              <a:rPr lang="en-US" dirty="0" err="1"/>
+              <a:t>nur</a:t>
+            </a:r>
+            <a:r>
+              <a:rPr lang="en-US" dirty="0"/>
+              <a:t> </a:t>
+            </a:r>
+            <a:r>
+              <a:rPr lang="en-US" dirty="0" err="1"/>
+              <a:t>jede</a:t>
+            </a:r>
+            <a:r>
+              <a:rPr lang="en-US" dirty="0"/>
+              <a:t> </a:t>
+            </a:r>
+            <a:r>
+              <a:rPr lang="en-US" dirty="0" err="1"/>
+              <a:t>zweite</a:t>
+            </a:r>
+            <a:r>
+              <a:rPr lang="en-US" dirty="0"/>
+              <a:t> </a:t>
+            </a:r>
+            <a:r>
+              <a:rPr lang="en-US" dirty="0" err="1"/>
+              <a:t>Ausgabe</a:t>
+            </a:r>
+            <a:r>
+              <a:rPr lang="en-US" dirty="0"/>
+              <a:t> 	</a:t>
+            </a:r>
+            <a:r>
+              <a:rPr lang="en-US" dirty="0" err="1"/>
+              <a:t>angezeigt</a:t>
+            </a:r>
+            <a:r>
+              <a:rPr lang="en-US" dirty="0"/>
+              <a:t>, </a:t>
+            </a:r>
+            <a:r>
+              <a:rPr lang="en-US" dirty="0">
+                <a:sym typeface="Wingdings" panose="05000000000000000000" pitchFamily="2" charset="2"/>
+              </a:rPr>
+              <a:t> </a:t>
+            </a:r>
+            <a:r>
+              <a:rPr lang="en-US" dirty="0" err="1">
+                <a:sym typeface="Wingdings" panose="05000000000000000000" pitchFamily="2" charset="2"/>
+              </a:rPr>
+              <a:t>blinken</a:t>
+            </a:r>
+            <a:endParaRPr lang="en-US" dirty="0">
+              <a:sym typeface="Wingdings" panose="05000000000000000000" pitchFamily="2" charset="2"/>
+            </a:endParaRPr>
+          </a:p>
+          <a:p>
+            <a:r>
+              <a:rPr lang="en-US" dirty="0" err="1">
+                <a:sym typeface="Wingdings" panose="05000000000000000000" pitchFamily="2" charset="2"/>
+              </a:rPr>
+              <a:t>Eingabe</a:t>
+            </a:r>
+            <a:r>
+              <a:rPr lang="en-US" dirty="0">
+                <a:sym typeface="Wingdings" panose="05000000000000000000" pitchFamily="2" charset="2"/>
+              </a:rPr>
+              <a:t>: Keypad; Port2 </a:t>
+            </a:r>
+            <a:r>
+              <a:rPr lang="en-US" dirty="0" err="1">
+                <a:sym typeface="Wingdings" panose="05000000000000000000" pitchFamily="2" charset="2"/>
+              </a:rPr>
+              <a:t>Schalter</a:t>
+            </a:r>
+            <a:r>
+              <a:rPr lang="en-US" dirty="0">
+                <a:sym typeface="Wingdings" panose="05000000000000000000" pitchFamily="2" charset="2"/>
+              </a:rPr>
+              <a:t> </a:t>
+            </a:r>
+            <a:r>
+              <a:rPr lang="en-US" dirty="0" err="1">
+                <a:sym typeface="Wingdings" panose="05000000000000000000" pitchFamily="2" charset="2"/>
+              </a:rPr>
+              <a:t>betätigt</a:t>
+            </a:r>
+            <a:r>
+              <a:rPr lang="en-US" dirty="0">
+                <a:sym typeface="Wingdings" panose="05000000000000000000" pitchFamily="2" charset="2"/>
+              </a:rPr>
+              <a:t>, </a:t>
+            </a:r>
+            <a:r>
+              <a:rPr lang="en-US" dirty="0" err="1">
+                <a:sym typeface="Wingdings" panose="05000000000000000000" pitchFamily="2" charset="2"/>
+              </a:rPr>
+              <a:t>jeweiliger</a:t>
+            </a:r>
+            <a:r>
+              <a:rPr lang="en-US" dirty="0">
+                <a:sym typeface="Wingdings" panose="05000000000000000000" pitchFamily="2" charset="2"/>
+              </a:rPr>
+              <a:t> Pin </a:t>
+            </a:r>
+            <a:r>
+              <a:rPr lang="en-US" dirty="0" err="1">
+                <a:sym typeface="Wingdings" panose="05000000000000000000" pitchFamily="2" charset="2"/>
+              </a:rPr>
+              <a:t>mit</a:t>
+            </a:r>
+            <a:r>
+              <a:rPr lang="en-US" dirty="0">
+                <a:sym typeface="Wingdings" panose="05000000000000000000" pitchFamily="2" charset="2"/>
+              </a:rPr>
+              <a:t> </a:t>
+            </a:r>
+            <a:r>
+              <a:rPr lang="en-US" dirty="0" err="1">
+                <a:sym typeface="Wingdings" panose="05000000000000000000" pitchFamily="2" charset="2"/>
+              </a:rPr>
+              <a:t>Massenpotential</a:t>
+            </a:r>
+            <a:r>
+              <a:rPr lang="en-US" dirty="0">
+                <a:sym typeface="Wingdings" panose="05000000000000000000" pitchFamily="2" charset="2"/>
+              </a:rPr>
+              <a:t> </a:t>
+            </a:r>
+            <a:r>
+              <a:rPr lang="en-US" dirty="0" err="1">
+                <a:sym typeface="Wingdings" panose="05000000000000000000" pitchFamily="2" charset="2"/>
+              </a:rPr>
+              <a:t>verbunden</a:t>
+            </a:r>
+            <a:r>
+              <a:rPr lang="en-US" dirty="0">
+                <a:sym typeface="Wingdings" panose="05000000000000000000" pitchFamily="2" charset="2"/>
+              </a:rPr>
+              <a:t>  low </a:t>
+            </a:r>
+            <a:r>
+              <a:rPr lang="en-US" dirty="0" err="1">
+                <a:sym typeface="Wingdings" panose="05000000000000000000" pitchFamily="2" charset="2"/>
+              </a:rPr>
+              <a:t>gesetzt</a:t>
+            </a:r>
+            <a:endParaRPr lang="en-US" dirty="0"/>
           </a:p>
         </p:txBody>
       </p:sp>
@@ -858,6 +1096,144 @@
           <a:p>
             <a:r>
               <a:rPr lang="en-US" dirty="0"/>
+              <a:t>Ein Byte pro </a:t>
+            </a:r>
+            <a:r>
+              <a:rPr lang="en-US" dirty="0" err="1"/>
+              <a:t>Zeile</a:t>
+            </a:r>
+            <a:r>
+              <a:rPr lang="en-US" dirty="0"/>
+              <a:t> auf der Matrix des </a:t>
+            </a:r>
+            <a:r>
+              <a:rPr lang="en-US" dirty="0" err="1"/>
+              <a:t>Spielers</a:t>
+            </a:r>
+            <a:r>
+              <a:rPr lang="en-US" dirty="0"/>
+              <a:t>, </a:t>
+            </a:r>
+            <a:r>
+              <a:rPr lang="en-US" dirty="0" err="1"/>
+              <a:t>jeder</a:t>
+            </a:r>
+            <a:r>
+              <a:rPr lang="en-US" dirty="0"/>
+              <a:t> </a:t>
+            </a:r>
+            <a:r>
+              <a:rPr lang="en-US" dirty="0" err="1"/>
+              <a:t>Spieler</a:t>
+            </a:r>
+            <a:r>
+              <a:rPr lang="en-US" dirty="0"/>
+              <a:t> hat </a:t>
+            </a:r>
+            <a:r>
+              <a:rPr lang="en-US" dirty="0" err="1"/>
+              <a:t>seperat</a:t>
+            </a:r>
+            <a:r>
+              <a:rPr lang="en-US" dirty="0"/>
+              <a:t> </a:t>
+            </a:r>
+            <a:r>
+              <a:rPr lang="en-US" dirty="0" err="1"/>
+              <a:t>gespeicherten</a:t>
+            </a:r>
+            <a:r>
+              <a:rPr lang="en-US" dirty="0"/>
+              <a:t> </a:t>
+            </a:r>
+            <a:r>
+              <a:rPr lang="en-US" dirty="0" err="1"/>
+              <a:t>Spielstand</a:t>
+            </a:r>
+            <a:endParaRPr lang="en-US" dirty="0"/>
+          </a:p>
+          <a:p>
+            <a:r>
+              <a:rPr lang="en-US" dirty="0" err="1"/>
+              <a:t>Zeilen</a:t>
+            </a:r>
+            <a:r>
+              <a:rPr lang="en-US" dirty="0"/>
+              <a:t> </a:t>
+            </a:r>
+            <a:r>
+              <a:rPr lang="en-US" dirty="0" err="1"/>
+              <a:t>hintereinander</a:t>
+            </a:r>
+            <a:r>
+              <a:rPr lang="en-US" dirty="0"/>
+              <a:t> </a:t>
+            </a:r>
+            <a:r>
+              <a:rPr lang="en-US" dirty="0" err="1"/>
+              <a:t>im</a:t>
+            </a:r>
+            <a:r>
+              <a:rPr lang="en-US" dirty="0"/>
+              <a:t> RAM </a:t>
+            </a:r>
+            <a:r>
+              <a:rPr lang="en-US" dirty="0" err="1"/>
+              <a:t>angeordnet</a:t>
+            </a:r>
+            <a:r>
+              <a:rPr lang="en-US" dirty="0"/>
+              <a:t> -&gt; </a:t>
+            </a:r>
+            <a:r>
+              <a:rPr lang="en-US" dirty="0" err="1"/>
+              <a:t>Insgesamt</a:t>
+            </a:r>
+            <a:r>
+              <a:rPr lang="en-US" dirty="0"/>
+              <a:t> also 16 </a:t>
+            </a:r>
+            <a:r>
+              <a:rPr lang="en-US" dirty="0" err="1"/>
+              <a:t>Reihen</a:t>
+            </a:r>
+            <a:r>
+              <a:rPr lang="en-US" dirty="0"/>
+              <a:t> </a:t>
+            </a:r>
+            <a:r>
+              <a:rPr lang="en-US" dirty="0" err="1"/>
+              <a:t>im</a:t>
+            </a:r>
+            <a:r>
+              <a:rPr lang="en-US" dirty="0"/>
+              <a:t> RAM </a:t>
+            </a:r>
+            <a:r>
+              <a:rPr lang="en-US" dirty="0" err="1"/>
+              <a:t>für</a:t>
+            </a:r>
+            <a:r>
+              <a:rPr lang="en-US" dirty="0"/>
+              <a:t> die </a:t>
+            </a:r>
+            <a:r>
+              <a:rPr lang="en-US" dirty="0" err="1"/>
+              <a:t>speicherung</a:t>
+            </a:r>
+            <a:r>
+              <a:rPr lang="en-US" dirty="0"/>
+              <a:t> der </a:t>
+            </a:r>
+            <a:r>
+              <a:rPr lang="en-US" dirty="0" err="1"/>
+              <a:t>Spielstände</a:t>
+            </a:r>
+            <a:endParaRPr lang="en-US" dirty="0"/>
+          </a:p>
+          <a:p>
+            <a:r>
+              <a:rPr lang="en-US" dirty="0"/>
               <a:t>-&gt; Pascal</a:t>
             </a:r>
           </a:p>
@@ -1361,7 +1737,7 @@
           <a:p>
             <a:fld id="{BD53F27A-5BF1-40F9-A240-2C738F6BA072}" type="slidenum">
               <a:rPr lang="de-DE" smtClean="0"/>
-              <a:t>‹#›</a:t>
+              <a:t>‹Nr.›</a:t>
             </a:fld>
             <a:endParaRPr lang="de-DE"/>
           </a:p>
@@ -1559,7 +1935,7 @@
           <a:p>
             <a:fld id="{BD53F27A-5BF1-40F9-A240-2C738F6BA072}" type="slidenum">
               <a:rPr lang="de-DE" smtClean="0"/>
-              <a:t>‹#›</a:t>
+              <a:t>‹Nr.›</a:t>
             </a:fld>
             <a:endParaRPr lang="de-DE"/>
           </a:p>
@@ -1767,7 +2143,7 @@
           <a:p>
             <a:fld id="{BD53F27A-5BF1-40F9-A240-2C738F6BA072}" type="slidenum">
               <a:rPr lang="de-DE" smtClean="0"/>
-              <a:t>‹#›</a:t>
+              <a:t>‹Nr.›</a:t>
             </a:fld>
             <a:endParaRPr lang="de-DE"/>
           </a:p>
@@ -1965,7 +2341,7 @@
           <a:p>
             <a:fld id="{BD53F27A-5BF1-40F9-A240-2C738F6BA072}" type="slidenum">
               <a:rPr lang="de-DE" smtClean="0"/>
-              <a:t>‹#›</a:t>
+              <a:t>‹Nr.›</a:t>
             </a:fld>
             <a:endParaRPr lang="de-DE"/>
           </a:p>
@@ -2240,7 +2616,7 @@
           <a:p>
             <a:fld id="{BD53F27A-5BF1-40F9-A240-2C738F6BA072}" type="slidenum">
               <a:rPr lang="de-DE" smtClean="0"/>
-              <a:t>‹#›</a:t>
+              <a:t>‹Nr.›</a:t>
             </a:fld>
             <a:endParaRPr lang="de-DE"/>
           </a:p>
@@ -2505,7 +2881,7 @@
           <a:p>
             <a:fld id="{BD53F27A-5BF1-40F9-A240-2C738F6BA072}" type="slidenum">
               <a:rPr lang="de-DE" smtClean="0"/>
-              <a:t>‹#›</a:t>
+              <a:t>‹Nr.›</a:t>
             </a:fld>
             <a:endParaRPr lang="de-DE"/>
           </a:p>
@@ -2917,7 +3293,7 @@
           <a:p>
             <a:fld id="{BD53F27A-5BF1-40F9-A240-2C738F6BA072}" type="slidenum">
               <a:rPr lang="de-DE" smtClean="0"/>
-              <a:t>‹#›</a:t>
+              <a:t>‹Nr.›</a:t>
             </a:fld>
             <a:endParaRPr lang="de-DE"/>
           </a:p>
@@ -3058,7 +3434,7 @@
           <a:p>
             <a:fld id="{BD53F27A-5BF1-40F9-A240-2C738F6BA072}" type="slidenum">
               <a:rPr lang="de-DE" smtClean="0"/>
-              <a:t>‹#›</a:t>
+              <a:t>‹Nr.›</a:t>
             </a:fld>
             <a:endParaRPr lang="de-DE"/>
           </a:p>
@@ -3171,7 +3547,7 @@
           <a:p>
             <a:fld id="{BD53F27A-5BF1-40F9-A240-2C738F6BA072}" type="slidenum">
               <a:rPr lang="de-DE" smtClean="0"/>
-              <a:t>‹#›</a:t>
+              <a:t>‹Nr.›</a:t>
             </a:fld>
             <a:endParaRPr lang="de-DE"/>
           </a:p>
@@ -3482,7 +3858,7 @@
           <a:p>
             <a:fld id="{BD53F27A-5BF1-40F9-A240-2C738F6BA072}" type="slidenum">
               <a:rPr lang="de-DE" smtClean="0"/>
-              <a:t>‹#›</a:t>
+              <a:t>‹Nr.›</a:t>
             </a:fld>
             <a:endParaRPr lang="de-DE"/>
           </a:p>
@@ -3770,7 +4146,7 @@
           <a:p>
             <a:fld id="{BD53F27A-5BF1-40F9-A240-2C738F6BA072}" type="slidenum">
               <a:rPr lang="de-DE" smtClean="0"/>
-              <a:t>‹#›</a:t>
+              <a:t>‹Nr.›</a:t>
             </a:fld>
             <a:endParaRPr lang="de-DE"/>
           </a:p>
@@ -4047,7 +4423,7 @@
           <a:p>
             <a:fld id="{BD53F27A-5BF1-40F9-A240-2C738F6BA072}" type="slidenum">
               <a:rPr lang="de-DE" smtClean="0"/>
-              <a:t>‹#›</a:t>
+              <a:t>‹Nr.›</a:t>
             </a:fld>
             <a:endParaRPr lang="de-DE"/>
           </a:p>

</xml_diff>

<commit_message>
Agenda + live demo
</commit_message>
<xml_diff>
--- a/VierGewinnt.pptx
+++ b/VierGewinnt.pptx
@@ -5226,7 +5226,29 @@
                   </a:schemeClr>
                 </a:solidFill>
               </a:rPr>
-              <a:t>Heidinger, Matthis, </a:t>
+              <a:t>Heidinger, </a:t>
+            </a:r>
+            <a:r>
+              <a:rPr lang="de-DE" sz="1800" dirty="0" err="1">
+                <a:solidFill>
+                  <a:schemeClr val="tx1">
+                    <a:lumMod val="65000"/>
+                    <a:lumOff val="35000"/>
+                  </a:schemeClr>
+                </a:solidFill>
+              </a:rPr>
+              <a:t>Matthis</a:t>
+            </a:r>
+            <a:r>
+              <a:rPr lang="de-DE" sz="1800" dirty="0">
+                <a:solidFill>
+                  <a:schemeClr val="tx1">
+                    <a:lumMod val="65000"/>
+                    <a:lumOff val="35000"/>
+                  </a:schemeClr>
+                </a:solidFill>
+              </a:rPr>
+              <a:t>, </a:t>
             </a:r>
             <a:r>
               <a:rPr lang="de-DE" sz="1800" dirty="0" err="1">
@@ -9980,11 +10002,11 @@
             </a:pPr>
             <a:r>
               <a:rPr lang="de-DE" sz="3200" dirty="0"/>
-              <a:t>Speicherung des </a:t>
-            </a:r>
-            <a:r>
-              <a:rPr lang="de-DE" sz="3200" dirty="0" err="1"/>
-              <a:t>Spielstandaes</a:t>
+              <a:t>Speicherung </a:t>
+            </a:r>
+            <a:r>
+              <a:rPr lang="de-DE" sz="3200"/>
+              <a:t>des Spielstandes</a:t>
             </a:r>
             <a:endParaRPr lang="de-DE" sz="3200" dirty="0"/>
           </a:p>

</xml_diff>